<commit_message>
added more text to pages
</commit_message>
<xml_diff>
--- a/design.pptx
+++ b/design.pptx
@@ -193,7 +193,7 @@
           <a:p>
             <a:fld id="{605EE54A-3F9E-FC46-BA58-18B893159C71}" type="datetimeFigureOut">
               <a:rPr lang="en-US" smtClean="0"/>
-              <a:t>2014-04-03</a:t>
+              <a:t>2014-04-15</a:t>
             </a:fld>
             <a:endParaRPr lang="en-US"/>
           </a:p>
@@ -821,7 +821,7 @@
           <a:p>
             <a:fld id="{3C965B6C-0BED-7B4A-B7AC-C4ABD47C685B}" type="datetimeFigureOut">
               <a:rPr lang="en-US" smtClean="0"/>
-              <a:t>2014-04-03</a:t>
+              <a:t>2014-04-15</a:t>
             </a:fld>
             <a:endParaRPr lang="en-US"/>
           </a:p>
@@ -999,7 +999,7 @@
           <a:p>
             <a:fld id="{3C965B6C-0BED-7B4A-B7AC-C4ABD47C685B}" type="datetimeFigureOut">
               <a:rPr lang="en-US" smtClean="0"/>
-              <a:t>2014-04-03</a:t>
+              <a:t>2014-04-15</a:t>
             </a:fld>
             <a:endParaRPr lang="en-US"/>
           </a:p>
@@ -1182,7 +1182,7 @@
           <a:p>
             <a:fld id="{3C965B6C-0BED-7B4A-B7AC-C4ABD47C685B}" type="datetimeFigureOut">
               <a:rPr lang="en-US" smtClean="0"/>
-              <a:t>2014-04-03</a:t>
+              <a:t>2014-04-15</a:t>
             </a:fld>
             <a:endParaRPr lang="en-US"/>
           </a:p>
@@ -1360,7 +1360,7 @@
           <a:p>
             <a:fld id="{3C965B6C-0BED-7B4A-B7AC-C4ABD47C685B}" type="datetimeFigureOut">
               <a:rPr lang="en-US" smtClean="0"/>
-              <a:t>2014-04-03</a:t>
+              <a:t>2014-04-15</a:t>
             </a:fld>
             <a:endParaRPr lang="en-US"/>
           </a:p>
@@ -1609,7 +1609,7 @@
           <a:p>
             <a:fld id="{3C965B6C-0BED-7B4A-B7AC-C4ABD47C685B}" type="datetimeFigureOut">
               <a:rPr lang="en-US" smtClean="0"/>
-              <a:t>2014-04-03</a:t>
+              <a:t>2014-04-15</a:t>
             </a:fld>
             <a:endParaRPr lang="en-US"/>
           </a:p>
@@ -1905,7 +1905,7 @@
           <a:p>
             <a:fld id="{3C965B6C-0BED-7B4A-B7AC-C4ABD47C685B}" type="datetimeFigureOut">
               <a:rPr lang="en-US" smtClean="0"/>
-              <a:t>2014-04-03</a:t>
+              <a:t>2014-04-15</a:t>
             </a:fld>
             <a:endParaRPr lang="en-US"/>
           </a:p>
@@ -2335,7 +2335,7 @@
           <a:p>
             <a:fld id="{3C965B6C-0BED-7B4A-B7AC-C4ABD47C685B}" type="datetimeFigureOut">
               <a:rPr lang="en-US" smtClean="0"/>
-              <a:t>2014-04-03</a:t>
+              <a:t>2014-04-15</a:t>
             </a:fld>
             <a:endParaRPr lang="en-US"/>
           </a:p>
@@ -2461,7 +2461,7 @@
           <a:p>
             <a:fld id="{3C965B6C-0BED-7B4A-B7AC-C4ABD47C685B}" type="datetimeFigureOut">
               <a:rPr lang="en-US" smtClean="0"/>
-              <a:t>2014-04-03</a:t>
+              <a:t>2014-04-15</a:t>
             </a:fld>
             <a:endParaRPr lang="en-US"/>
           </a:p>
@@ -2556,7 +2556,7 @@
           <a:p>
             <a:fld id="{3C965B6C-0BED-7B4A-B7AC-C4ABD47C685B}" type="datetimeFigureOut">
               <a:rPr lang="en-US" smtClean="0"/>
-              <a:t>2014-04-03</a:t>
+              <a:t>2014-04-15</a:t>
             </a:fld>
             <a:endParaRPr lang="en-US"/>
           </a:p>
@@ -2836,7 +2836,7 @@
           <a:p>
             <a:fld id="{3C965B6C-0BED-7B4A-B7AC-C4ABD47C685B}" type="datetimeFigureOut">
               <a:rPr lang="en-US" smtClean="0"/>
-              <a:t>2014-04-03</a:t>
+              <a:t>2014-04-15</a:t>
             </a:fld>
             <a:endParaRPr lang="en-US"/>
           </a:p>
@@ -3092,7 +3092,7 @@
           <a:p>
             <a:fld id="{3C965B6C-0BED-7B4A-B7AC-C4ABD47C685B}" type="datetimeFigureOut">
               <a:rPr lang="en-US" smtClean="0"/>
-              <a:t>2014-04-03</a:t>
+              <a:t>2014-04-15</a:t>
             </a:fld>
             <a:endParaRPr lang="en-US"/>
           </a:p>
@@ -3272,7 +3272,7 @@
           <a:p>
             <a:fld id="{3C965B6C-0BED-7B4A-B7AC-C4ABD47C685B}" type="datetimeFigureOut">
               <a:rPr lang="en-US" smtClean="0"/>
-              <a:t>2014-04-03</a:t>
+              <a:t>2014-04-15</a:t>
             </a:fld>
             <a:endParaRPr lang="en-US"/>
           </a:p>
@@ -5095,7 +5095,7 @@
           <a:lstStyle/>
           <a:p>
             <a:pPr algn="ctr"/>
-            <a:endParaRPr lang="en-US"/>
+            <a:endParaRPr lang="en-US" dirty="0"/>
           </a:p>
         </p:txBody>
       </p:sp>
@@ -6340,7 +6340,7 @@
         </p:nvSpPr>
         <p:spPr>
           <a:xfrm>
-            <a:off x="1595573" y="1222358"/>
+            <a:off x="2945100" y="1222358"/>
             <a:ext cx="1332589" cy="1258654"/>
           </a:xfrm>
           <a:prstGeom prst="rect">
@@ -6388,7 +6388,7 @@
         </p:nvSpPr>
         <p:spPr>
           <a:xfrm>
-            <a:off x="1595573" y="1146051"/>
+            <a:off x="2945100" y="1146051"/>
             <a:ext cx="1332589" cy="1302921"/>
           </a:xfrm>
           <a:prstGeom prst="rect">
@@ -6488,7 +6488,7 @@
         </p:nvCxnSpPr>
         <p:spPr>
           <a:xfrm>
-            <a:off x="1693400" y="1489182"/>
+            <a:off x="3042927" y="1489182"/>
             <a:ext cx="1111630" cy="0"/>
           </a:xfrm>
           <a:prstGeom prst="line">
@@ -6528,7 +6528,7 @@
         </p:nvCxnSpPr>
         <p:spPr>
           <a:xfrm>
-            <a:off x="1693400" y="1714568"/>
+            <a:off x="3042927" y="1714568"/>
             <a:ext cx="1111630" cy="0"/>
           </a:xfrm>
           <a:prstGeom prst="line">
@@ -6568,7 +6568,7 @@
         </p:nvCxnSpPr>
         <p:spPr>
           <a:xfrm>
-            <a:off x="1693400" y="1963794"/>
+            <a:off x="3042927" y="1963794"/>
             <a:ext cx="1111630" cy="0"/>
           </a:xfrm>
           <a:prstGeom prst="line">
@@ -6608,7 +6608,7 @@
         </p:nvCxnSpPr>
         <p:spPr>
           <a:xfrm>
-            <a:off x="1693400" y="2210005"/>
+            <a:off x="3042927" y="2210005"/>
             <a:ext cx="1111630" cy="0"/>
           </a:xfrm>
           <a:prstGeom prst="line">

</xml_diff>

<commit_message>
put fake text into the design
</commit_message>
<xml_diff>
--- a/design.pptx
+++ b/design.pptx
@@ -193,7 +193,7 @@
           <a:p>
             <a:fld id="{605EE54A-3F9E-FC46-BA58-18B893159C71}" type="datetimeFigureOut">
               <a:rPr lang="en-US" smtClean="0"/>
-              <a:t>2014-04-15</a:t>
+              <a:t>2014-04-28</a:t>
             </a:fld>
             <a:endParaRPr lang="en-US"/>
           </a:p>
@@ -821,7 +821,7 @@
           <a:p>
             <a:fld id="{3C965B6C-0BED-7B4A-B7AC-C4ABD47C685B}" type="datetimeFigureOut">
               <a:rPr lang="en-US" smtClean="0"/>
-              <a:t>2014-04-15</a:t>
+              <a:t>2014-04-28</a:t>
             </a:fld>
             <a:endParaRPr lang="en-US"/>
           </a:p>
@@ -999,7 +999,7 @@
           <a:p>
             <a:fld id="{3C965B6C-0BED-7B4A-B7AC-C4ABD47C685B}" type="datetimeFigureOut">
               <a:rPr lang="en-US" smtClean="0"/>
-              <a:t>2014-04-15</a:t>
+              <a:t>2014-04-28</a:t>
             </a:fld>
             <a:endParaRPr lang="en-US"/>
           </a:p>
@@ -1182,7 +1182,7 @@
           <a:p>
             <a:fld id="{3C965B6C-0BED-7B4A-B7AC-C4ABD47C685B}" type="datetimeFigureOut">
               <a:rPr lang="en-US" smtClean="0"/>
-              <a:t>2014-04-15</a:t>
+              <a:t>2014-04-28</a:t>
             </a:fld>
             <a:endParaRPr lang="en-US"/>
           </a:p>
@@ -1360,7 +1360,7 @@
           <a:p>
             <a:fld id="{3C965B6C-0BED-7B4A-B7AC-C4ABD47C685B}" type="datetimeFigureOut">
               <a:rPr lang="en-US" smtClean="0"/>
-              <a:t>2014-04-15</a:t>
+              <a:t>2014-04-28</a:t>
             </a:fld>
             <a:endParaRPr lang="en-US"/>
           </a:p>
@@ -1609,7 +1609,7 @@
           <a:p>
             <a:fld id="{3C965B6C-0BED-7B4A-B7AC-C4ABD47C685B}" type="datetimeFigureOut">
               <a:rPr lang="en-US" smtClean="0"/>
-              <a:t>2014-04-15</a:t>
+              <a:t>2014-04-28</a:t>
             </a:fld>
             <a:endParaRPr lang="en-US"/>
           </a:p>
@@ -1905,7 +1905,7 @@
           <a:p>
             <a:fld id="{3C965B6C-0BED-7B4A-B7AC-C4ABD47C685B}" type="datetimeFigureOut">
               <a:rPr lang="en-US" smtClean="0"/>
-              <a:t>2014-04-15</a:t>
+              <a:t>2014-04-28</a:t>
             </a:fld>
             <a:endParaRPr lang="en-US"/>
           </a:p>
@@ -2335,7 +2335,7 @@
           <a:p>
             <a:fld id="{3C965B6C-0BED-7B4A-B7AC-C4ABD47C685B}" type="datetimeFigureOut">
               <a:rPr lang="en-US" smtClean="0"/>
-              <a:t>2014-04-15</a:t>
+              <a:t>2014-04-28</a:t>
             </a:fld>
             <a:endParaRPr lang="en-US"/>
           </a:p>
@@ -2461,7 +2461,7 @@
           <a:p>
             <a:fld id="{3C965B6C-0BED-7B4A-B7AC-C4ABD47C685B}" type="datetimeFigureOut">
               <a:rPr lang="en-US" smtClean="0"/>
-              <a:t>2014-04-15</a:t>
+              <a:t>2014-04-28</a:t>
             </a:fld>
             <a:endParaRPr lang="en-US"/>
           </a:p>
@@ -2556,7 +2556,7 @@
           <a:p>
             <a:fld id="{3C965B6C-0BED-7B4A-B7AC-C4ABD47C685B}" type="datetimeFigureOut">
               <a:rPr lang="en-US" smtClean="0"/>
-              <a:t>2014-04-15</a:t>
+              <a:t>2014-04-28</a:t>
             </a:fld>
             <a:endParaRPr lang="en-US"/>
           </a:p>
@@ -2836,7 +2836,7 @@
           <a:p>
             <a:fld id="{3C965B6C-0BED-7B4A-B7AC-C4ABD47C685B}" type="datetimeFigureOut">
               <a:rPr lang="en-US" smtClean="0"/>
-              <a:t>2014-04-15</a:t>
+              <a:t>2014-04-28</a:t>
             </a:fld>
             <a:endParaRPr lang="en-US"/>
           </a:p>
@@ -3092,7 +3092,7 @@
           <a:p>
             <a:fld id="{3C965B6C-0BED-7B4A-B7AC-C4ABD47C685B}" type="datetimeFigureOut">
               <a:rPr lang="en-US" smtClean="0"/>
-              <a:t>2014-04-15</a:t>
+              <a:t>2014-04-28</a:t>
             </a:fld>
             <a:endParaRPr lang="en-US"/>
           </a:p>
@@ -3272,7 +3272,7 @@
           <a:p>
             <a:fld id="{3C965B6C-0BED-7B4A-B7AC-C4ABD47C685B}" type="datetimeFigureOut">
               <a:rPr lang="en-US" smtClean="0"/>
-              <a:t>2014-04-15</a:t>
+              <a:t>2014-04-28</a:t>
             </a:fld>
             <a:endParaRPr lang="en-US"/>
           </a:p>
@@ -4059,33 +4059,719 @@
           <a:lstStyle/>
           <a:p>
             <a:r>
+              <a:rPr lang="en-US" sz="900" dirty="0" err="1" smtClean="0">
+                <a:latin typeface="Avenir Book"/>
+                <a:cs typeface="Avenir Book"/>
+              </a:rPr>
+              <a:t>Lorem</a:t>
+            </a:r>
+            <a:r>
               <a:rPr lang="en-US" sz="900" dirty="0" smtClean="0">
                 <a:latin typeface="Avenir Book"/>
                 <a:cs typeface="Avenir Book"/>
               </a:rPr>
-              <a:t>Fires blah blah blah blah blah fires are dangerous they burn things. This is a paragraph all about fires and their scariness and how much they are terrifying and creepy and make me crawl into a bunker.</a:t>
-            </a:r>
-          </a:p>
-          <a:p>
-            <a:endParaRPr lang="en-US" sz="900" dirty="0">
-              <a:latin typeface="Avenir Book"/>
-              <a:cs typeface="Avenir Book"/>
-            </a:endParaRPr>
-          </a:p>
-          <a:p>
+              <a:t> </a:t>
+            </a:r>
+            <a:r>
+              <a:rPr lang="en-US" sz="900" dirty="0" err="1">
+                <a:latin typeface="Avenir Book"/>
+                <a:cs typeface="Avenir Book"/>
+              </a:rPr>
+              <a:t>ipsum</a:t>
+            </a:r>
+            <a:r>
+              <a:rPr lang="en-US" sz="900" dirty="0">
+                <a:latin typeface="Avenir Book"/>
+                <a:cs typeface="Avenir Book"/>
+              </a:rPr>
+              <a:t> dolor sit </a:t>
+            </a:r>
+            <a:r>
+              <a:rPr lang="en-US" sz="900" dirty="0" err="1">
+                <a:latin typeface="Avenir Book"/>
+                <a:cs typeface="Avenir Book"/>
+              </a:rPr>
+              <a:t>amet</a:t>
+            </a:r>
+            <a:r>
+              <a:rPr lang="en-US" sz="900" dirty="0">
+                <a:latin typeface="Avenir Book"/>
+                <a:cs typeface="Avenir Book"/>
+              </a:rPr>
+              <a:t>, </a:t>
+            </a:r>
+            <a:r>
+              <a:rPr lang="en-US" sz="900" dirty="0" err="1">
+                <a:latin typeface="Avenir Book"/>
+                <a:cs typeface="Avenir Book"/>
+              </a:rPr>
+              <a:t>consectetur</a:t>
+            </a:r>
+            <a:r>
+              <a:rPr lang="en-US" sz="900" dirty="0">
+                <a:latin typeface="Avenir Book"/>
+                <a:cs typeface="Avenir Book"/>
+              </a:rPr>
+              <a:t> </a:t>
+            </a:r>
+            <a:r>
+              <a:rPr lang="en-US" sz="900" dirty="0" err="1">
+                <a:latin typeface="Avenir Book"/>
+                <a:cs typeface="Avenir Book"/>
+              </a:rPr>
+              <a:t>adipisicing</a:t>
+            </a:r>
+            <a:r>
+              <a:rPr lang="en-US" sz="900" dirty="0">
+                <a:latin typeface="Avenir Book"/>
+                <a:cs typeface="Avenir Book"/>
+              </a:rPr>
+              <a:t> </a:t>
+            </a:r>
+            <a:r>
+              <a:rPr lang="en-US" sz="900" dirty="0" err="1">
+                <a:latin typeface="Avenir Book"/>
+                <a:cs typeface="Avenir Book"/>
+              </a:rPr>
+              <a:t>elit</a:t>
+            </a:r>
+            <a:r>
+              <a:rPr lang="en-US" sz="900" dirty="0">
+                <a:latin typeface="Avenir Book"/>
+                <a:cs typeface="Avenir Book"/>
+              </a:rPr>
+              <a:t>, </a:t>
+            </a:r>
+            <a:r>
+              <a:rPr lang="en-US" sz="900" dirty="0" err="1">
+                <a:latin typeface="Avenir Book"/>
+                <a:cs typeface="Avenir Book"/>
+              </a:rPr>
+              <a:t>sed</a:t>
+            </a:r>
+            <a:r>
+              <a:rPr lang="en-US" sz="900" dirty="0">
+                <a:latin typeface="Avenir Book"/>
+                <a:cs typeface="Avenir Book"/>
+              </a:rPr>
+              <a:t> do </a:t>
+            </a:r>
+            <a:r>
+              <a:rPr lang="en-US" sz="900" dirty="0" err="1">
+                <a:latin typeface="Avenir Book"/>
+                <a:cs typeface="Avenir Book"/>
+              </a:rPr>
+              <a:t>eiusmod</a:t>
+            </a:r>
+            <a:r>
+              <a:rPr lang="en-US" sz="900" dirty="0">
+                <a:latin typeface="Avenir Book"/>
+                <a:cs typeface="Avenir Book"/>
+              </a:rPr>
+              <a:t> </a:t>
+            </a:r>
+            <a:r>
+              <a:rPr lang="en-US" sz="900" dirty="0" err="1">
+                <a:latin typeface="Avenir Book"/>
+                <a:cs typeface="Avenir Book"/>
+              </a:rPr>
+              <a:t>tempor</a:t>
+            </a:r>
+            <a:r>
+              <a:rPr lang="en-US" sz="900" dirty="0">
+                <a:latin typeface="Avenir Book"/>
+                <a:cs typeface="Avenir Book"/>
+              </a:rPr>
+              <a:t> </a:t>
+            </a:r>
+            <a:r>
+              <a:rPr lang="en-US" sz="900" dirty="0" err="1">
+                <a:latin typeface="Avenir Book"/>
+                <a:cs typeface="Avenir Book"/>
+              </a:rPr>
+              <a:t>incididunt</a:t>
+            </a:r>
+            <a:r>
+              <a:rPr lang="en-US" sz="900" dirty="0">
+                <a:latin typeface="Avenir Book"/>
+                <a:cs typeface="Avenir Book"/>
+              </a:rPr>
+              <a:t> </a:t>
+            </a:r>
+            <a:r>
+              <a:rPr lang="en-US" sz="900" dirty="0" err="1">
+                <a:latin typeface="Avenir Book"/>
+                <a:cs typeface="Avenir Book"/>
+              </a:rPr>
+              <a:t>ut</a:t>
+            </a:r>
+            <a:r>
+              <a:rPr lang="en-US" sz="900" dirty="0">
+                <a:latin typeface="Avenir Book"/>
+                <a:cs typeface="Avenir Book"/>
+              </a:rPr>
+              <a:t> </a:t>
+            </a:r>
+            <a:r>
+              <a:rPr lang="en-US" sz="900" dirty="0" err="1">
+                <a:latin typeface="Avenir Book"/>
+                <a:cs typeface="Avenir Book"/>
+              </a:rPr>
+              <a:t>labore</a:t>
+            </a:r>
+            <a:r>
+              <a:rPr lang="en-US" sz="900" dirty="0">
+                <a:latin typeface="Avenir Book"/>
+                <a:cs typeface="Avenir Book"/>
+              </a:rPr>
+              <a:t> et </a:t>
+            </a:r>
+            <a:r>
+              <a:rPr lang="en-US" sz="900" dirty="0" err="1">
+                <a:latin typeface="Avenir Book"/>
+                <a:cs typeface="Avenir Book"/>
+              </a:rPr>
+              <a:t>dolore</a:t>
+            </a:r>
+            <a:r>
+              <a:rPr lang="en-US" sz="900" dirty="0">
+                <a:latin typeface="Avenir Book"/>
+                <a:cs typeface="Avenir Book"/>
+              </a:rPr>
+              <a:t> magna </a:t>
+            </a:r>
+            <a:r>
+              <a:rPr lang="en-US" sz="900" dirty="0" err="1">
+                <a:latin typeface="Avenir Book"/>
+                <a:cs typeface="Avenir Book"/>
+              </a:rPr>
+              <a:t>aliqua</a:t>
+            </a:r>
+            <a:r>
+              <a:rPr lang="en-US" sz="900" dirty="0">
+                <a:latin typeface="Avenir Book"/>
+                <a:cs typeface="Avenir Book"/>
+              </a:rPr>
+              <a:t>. </a:t>
+            </a:r>
+            <a:r>
+              <a:rPr lang="en-US" sz="900" dirty="0" err="1">
+                <a:latin typeface="Avenir Book"/>
+                <a:cs typeface="Avenir Book"/>
+              </a:rPr>
+              <a:t>Ut</a:t>
+            </a:r>
+            <a:r>
+              <a:rPr lang="en-US" sz="900" dirty="0">
+                <a:latin typeface="Avenir Book"/>
+                <a:cs typeface="Avenir Book"/>
+              </a:rPr>
+              <a:t> </a:t>
+            </a:r>
+            <a:r>
+              <a:rPr lang="en-US" sz="900" dirty="0" err="1">
+                <a:latin typeface="Avenir Book"/>
+                <a:cs typeface="Avenir Book"/>
+              </a:rPr>
+              <a:t>enim</a:t>
+            </a:r>
+            <a:r>
+              <a:rPr lang="en-US" sz="900" dirty="0">
+                <a:latin typeface="Avenir Book"/>
+                <a:cs typeface="Avenir Book"/>
+              </a:rPr>
+              <a:t> ad minim </a:t>
+            </a:r>
+            <a:r>
+              <a:rPr lang="en-US" sz="900" dirty="0" err="1">
+                <a:latin typeface="Avenir Book"/>
+                <a:cs typeface="Avenir Book"/>
+              </a:rPr>
+              <a:t>veniam</a:t>
+            </a:r>
+            <a:r>
+              <a:rPr lang="en-US" sz="900" dirty="0">
+                <a:latin typeface="Avenir Book"/>
+                <a:cs typeface="Avenir Book"/>
+              </a:rPr>
+              <a:t>, </a:t>
+            </a:r>
+            <a:r>
+              <a:rPr lang="en-US" sz="900" dirty="0" err="1">
+                <a:latin typeface="Avenir Book"/>
+                <a:cs typeface="Avenir Book"/>
+              </a:rPr>
+              <a:t>quis</a:t>
+            </a:r>
+            <a:r>
+              <a:rPr lang="en-US" sz="900" dirty="0">
+                <a:latin typeface="Avenir Book"/>
+                <a:cs typeface="Avenir Book"/>
+              </a:rPr>
+              <a:t> </a:t>
+            </a:r>
+            <a:r>
+              <a:rPr lang="en-US" sz="900" dirty="0" err="1">
+                <a:latin typeface="Avenir Book"/>
+                <a:cs typeface="Avenir Book"/>
+              </a:rPr>
+              <a:t>nostrud</a:t>
+            </a:r>
+            <a:r>
+              <a:rPr lang="en-US" sz="900" dirty="0">
+                <a:latin typeface="Avenir Book"/>
+                <a:cs typeface="Avenir Book"/>
+              </a:rPr>
+              <a:t> exercitation </a:t>
+            </a:r>
+            <a:r>
+              <a:rPr lang="en-US" sz="900" dirty="0" err="1">
+                <a:latin typeface="Avenir Book"/>
+                <a:cs typeface="Avenir Book"/>
+              </a:rPr>
+              <a:t>ullamco</a:t>
+            </a:r>
+            <a:r>
+              <a:rPr lang="en-US" sz="900" dirty="0">
+                <a:latin typeface="Avenir Book"/>
+                <a:cs typeface="Avenir Book"/>
+              </a:rPr>
+              <a:t> </a:t>
+            </a:r>
+            <a:r>
+              <a:rPr lang="en-US" sz="900" dirty="0" err="1">
+                <a:latin typeface="Avenir Book"/>
+                <a:cs typeface="Avenir Book"/>
+              </a:rPr>
+              <a:t>laboris</a:t>
+            </a:r>
+            <a:r>
+              <a:rPr lang="en-US" sz="900" dirty="0">
+                <a:latin typeface="Avenir Book"/>
+                <a:cs typeface="Avenir Book"/>
+              </a:rPr>
+              <a:t> nisi </a:t>
+            </a:r>
+            <a:r>
+              <a:rPr lang="en-US" sz="900" dirty="0" err="1">
+                <a:latin typeface="Avenir Book"/>
+                <a:cs typeface="Avenir Book"/>
+              </a:rPr>
+              <a:t>ut</a:t>
+            </a:r>
+            <a:r>
+              <a:rPr lang="en-US" sz="900" dirty="0">
+                <a:latin typeface="Avenir Book"/>
+                <a:cs typeface="Avenir Book"/>
+              </a:rPr>
+              <a:t> </a:t>
+            </a:r>
+            <a:r>
+              <a:rPr lang="en-US" sz="900" dirty="0" err="1">
+                <a:latin typeface="Avenir Book"/>
+                <a:cs typeface="Avenir Book"/>
+              </a:rPr>
+              <a:t>aliquip</a:t>
+            </a:r>
+            <a:r>
+              <a:rPr lang="en-US" sz="900" dirty="0">
+                <a:latin typeface="Avenir Book"/>
+                <a:cs typeface="Avenir Book"/>
+              </a:rPr>
+              <a:t> ex </a:t>
+            </a:r>
+            <a:r>
+              <a:rPr lang="en-US" sz="900" dirty="0" err="1">
+                <a:latin typeface="Avenir Book"/>
+                <a:cs typeface="Avenir Book"/>
+              </a:rPr>
+              <a:t>ea</a:t>
+            </a:r>
+            <a:r>
+              <a:rPr lang="en-US" sz="900" dirty="0">
+                <a:latin typeface="Avenir Book"/>
+                <a:cs typeface="Avenir Book"/>
+              </a:rPr>
+              <a:t> </a:t>
+            </a:r>
+            <a:r>
+              <a:rPr lang="en-US" sz="900" dirty="0" err="1">
+                <a:latin typeface="Avenir Book"/>
+                <a:cs typeface="Avenir Book"/>
+              </a:rPr>
+              <a:t>commodo</a:t>
+            </a:r>
+            <a:r>
+              <a:rPr lang="en-US" sz="900" dirty="0">
+                <a:latin typeface="Avenir Book"/>
+                <a:cs typeface="Avenir Book"/>
+              </a:rPr>
+              <a:t> </a:t>
+            </a:r>
+            <a:r>
+              <a:rPr lang="en-US" sz="900" dirty="0" err="1">
+                <a:latin typeface="Avenir Book"/>
+                <a:cs typeface="Avenir Book"/>
+              </a:rPr>
+              <a:t>consequat</a:t>
+            </a:r>
+            <a:r>
+              <a:rPr lang="en-US" sz="900" dirty="0">
+                <a:latin typeface="Avenir Book"/>
+                <a:cs typeface="Avenir Book"/>
+              </a:rPr>
+              <a:t>. </a:t>
+            </a:r>
+            <a:r>
+              <a:rPr lang="en-US" sz="900" dirty="0" err="1">
+                <a:latin typeface="Avenir Book"/>
+                <a:cs typeface="Avenir Book"/>
+              </a:rPr>
+              <a:t>Duis</a:t>
+            </a:r>
+            <a:r>
+              <a:rPr lang="en-US" sz="900" dirty="0">
+                <a:latin typeface="Avenir Book"/>
+                <a:cs typeface="Avenir Book"/>
+              </a:rPr>
+              <a:t> </a:t>
+            </a:r>
+            <a:r>
+              <a:rPr lang="en-US" sz="900" dirty="0" err="1">
+                <a:latin typeface="Avenir Book"/>
+                <a:cs typeface="Avenir Book"/>
+              </a:rPr>
+              <a:t>aute</a:t>
+            </a:r>
+            <a:r>
+              <a:rPr lang="en-US" sz="900" dirty="0">
+                <a:latin typeface="Avenir Book"/>
+                <a:cs typeface="Avenir Book"/>
+              </a:rPr>
+              <a:t> </a:t>
+            </a:r>
+            <a:r>
+              <a:rPr lang="en-US" sz="900" dirty="0" err="1">
+                <a:latin typeface="Avenir Book"/>
+                <a:cs typeface="Avenir Book"/>
+              </a:rPr>
+              <a:t>irure</a:t>
+            </a:r>
+            <a:r>
+              <a:rPr lang="en-US" sz="900" dirty="0">
+                <a:latin typeface="Avenir Book"/>
+                <a:cs typeface="Avenir Book"/>
+              </a:rPr>
+              <a:t> dolor in </a:t>
+            </a:r>
+            <a:r>
+              <a:rPr lang="en-US" sz="900" dirty="0" err="1">
+                <a:latin typeface="Avenir Book"/>
+                <a:cs typeface="Avenir Book"/>
+              </a:rPr>
+              <a:t>reprehenderit</a:t>
+            </a:r>
+            <a:r>
+              <a:rPr lang="en-US" sz="900" dirty="0">
+                <a:latin typeface="Avenir Book"/>
+                <a:cs typeface="Avenir Book"/>
+              </a:rPr>
+              <a:t> in </a:t>
+            </a:r>
+            <a:r>
+              <a:rPr lang="en-US" sz="900" dirty="0" err="1">
+                <a:latin typeface="Avenir Book"/>
+                <a:cs typeface="Avenir Book"/>
+              </a:rPr>
+              <a:t>voluptate</a:t>
+            </a:r>
+            <a:r>
+              <a:rPr lang="en-US" sz="900" dirty="0">
+                <a:latin typeface="Avenir Book"/>
+                <a:cs typeface="Avenir Book"/>
+              </a:rPr>
+              <a:t> </a:t>
+            </a:r>
+            <a:r>
+              <a:rPr lang="en-US" sz="900" dirty="0" err="1">
+                <a:latin typeface="Avenir Book"/>
+                <a:cs typeface="Avenir Book"/>
+              </a:rPr>
+              <a:t>velit</a:t>
+            </a:r>
+            <a:r>
+              <a:rPr lang="en-US" sz="900" dirty="0">
+                <a:latin typeface="Avenir Book"/>
+                <a:cs typeface="Avenir Book"/>
+              </a:rPr>
+              <a:t> </a:t>
+            </a:r>
+            <a:r>
+              <a:rPr lang="en-US" sz="900" dirty="0" err="1">
+                <a:latin typeface="Avenir Book"/>
+                <a:cs typeface="Avenir Book"/>
+              </a:rPr>
+              <a:t>esse</a:t>
+            </a:r>
+            <a:r>
+              <a:rPr lang="en-US" sz="900" dirty="0">
+                <a:latin typeface="Avenir Book"/>
+                <a:cs typeface="Avenir Book"/>
+              </a:rPr>
+              <a:t> </a:t>
+            </a:r>
+            <a:r>
+              <a:rPr lang="en-US" sz="900" dirty="0" err="1">
+                <a:latin typeface="Avenir Book"/>
+                <a:cs typeface="Avenir Book"/>
+              </a:rPr>
+              <a:t>cillum</a:t>
+            </a:r>
+            <a:r>
+              <a:rPr lang="en-US" sz="900" dirty="0">
+                <a:latin typeface="Avenir Book"/>
+                <a:cs typeface="Avenir Book"/>
+              </a:rPr>
+              <a:t> </a:t>
+            </a:r>
+            <a:r>
+              <a:rPr lang="en-US" sz="900" dirty="0" err="1">
+                <a:latin typeface="Avenir Book"/>
+                <a:cs typeface="Avenir Book"/>
+              </a:rPr>
+              <a:t>dolore</a:t>
+            </a:r>
+            <a:r>
+              <a:rPr lang="en-US" sz="900" dirty="0">
+                <a:latin typeface="Avenir Book"/>
+                <a:cs typeface="Avenir Book"/>
+              </a:rPr>
+              <a:t> </a:t>
+            </a:r>
+            <a:r>
+              <a:rPr lang="en-US" sz="900" dirty="0" err="1">
+                <a:latin typeface="Avenir Book"/>
+                <a:cs typeface="Avenir Book"/>
+              </a:rPr>
+              <a:t>eu</a:t>
+            </a:r>
+            <a:r>
+              <a:rPr lang="en-US" sz="900" dirty="0">
+                <a:latin typeface="Avenir Book"/>
+                <a:cs typeface="Avenir Book"/>
+              </a:rPr>
+              <a:t> </a:t>
+            </a:r>
+            <a:r>
+              <a:rPr lang="en-US" sz="900" dirty="0" err="1">
+                <a:latin typeface="Avenir Book"/>
+                <a:cs typeface="Avenir Book"/>
+              </a:rPr>
+              <a:t>fugiat</a:t>
+            </a:r>
+            <a:r>
+              <a:rPr lang="en-US" sz="900" dirty="0">
+                <a:latin typeface="Avenir Book"/>
+                <a:cs typeface="Avenir Book"/>
+              </a:rPr>
+              <a:t> </a:t>
+            </a:r>
+            <a:r>
+              <a:rPr lang="en-US" sz="900" dirty="0" err="1">
+                <a:latin typeface="Avenir Book"/>
+                <a:cs typeface="Avenir Book"/>
+              </a:rPr>
+              <a:t>nulla</a:t>
+            </a:r>
+            <a:r>
+              <a:rPr lang="en-US" sz="900" dirty="0">
+                <a:latin typeface="Avenir Book"/>
+                <a:cs typeface="Avenir Book"/>
+              </a:rPr>
+              <a:t> </a:t>
+            </a:r>
+            <a:r>
+              <a:rPr lang="en-US" sz="900" dirty="0" err="1">
+                <a:latin typeface="Avenir Book"/>
+                <a:cs typeface="Avenir Book"/>
+              </a:rPr>
+              <a:t>pariatur</a:t>
+            </a:r>
+            <a:r>
+              <a:rPr lang="en-US" sz="900" dirty="0">
+                <a:latin typeface="Avenir Book"/>
+                <a:cs typeface="Avenir Book"/>
+              </a:rPr>
+              <a:t>. </a:t>
+            </a:r>
+            <a:r>
+              <a:rPr lang="en-US" sz="900" dirty="0" err="1">
+                <a:latin typeface="Avenir Book"/>
+                <a:cs typeface="Avenir Book"/>
+              </a:rPr>
+              <a:t>Excepteur</a:t>
+            </a:r>
+            <a:r>
+              <a:rPr lang="en-US" sz="900" dirty="0">
+                <a:latin typeface="Avenir Book"/>
+                <a:cs typeface="Avenir Book"/>
+              </a:rPr>
+              <a:t> </a:t>
+            </a:r>
+            <a:r>
+              <a:rPr lang="en-US" sz="900" dirty="0" err="1">
+                <a:latin typeface="Avenir Book"/>
+                <a:cs typeface="Avenir Book"/>
+              </a:rPr>
+              <a:t>sint</a:t>
+            </a:r>
+            <a:r>
+              <a:rPr lang="en-US" sz="900" dirty="0">
+                <a:latin typeface="Avenir Book"/>
+                <a:cs typeface="Avenir Book"/>
+              </a:rPr>
+              <a:t> </a:t>
+            </a:r>
+            <a:r>
+              <a:rPr lang="en-US" sz="900" dirty="0" err="1">
+                <a:latin typeface="Avenir Book"/>
+                <a:cs typeface="Avenir Book"/>
+              </a:rPr>
+              <a:t>occaecat</a:t>
+            </a:r>
+            <a:r>
+              <a:rPr lang="en-US" sz="900" dirty="0">
+                <a:latin typeface="Avenir Book"/>
+                <a:cs typeface="Avenir Book"/>
+              </a:rPr>
+              <a:t> </a:t>
+            </a:r>
+            <a:r>
+              <a:rPr lang="en-US" sz="900" dirty="0" err="1">
+                <a:latin typeface="Avenir Book"/>
+                <a:cs typeface="Avenir Book"/>
+              </a:rPr>
+              <a:t>cupidatat</a:t>
+            </a:r>
+            <a:r>
+              <a:rPr lang="en-US" sz="900" dirty="0">
+                <a:latin typeface="Avenir Book"/>
+                <a:cs typeface="Avenir Book"/>
+              </a:rPr>
+              <a:t> non </a:t>
+            </a:r>
+            <a:r>
+              <a:rPr lang="en-US" sz="900" dirty="0" err="1">
+                <a:latin typeface="Avenir Book"/>
+                <a:cs typeface="Avenir Book"/>
+              </a:rPr>
+              <a:t>proident</a:t>
+            </a:r>
+            <a:r>
+              <a:rPr lang="en-US" sz="900" dirty="0">
+                <a:latin typeface="Avenir Book"/>
+                <a:cs typeface="Avenir Book"/>
+              </a:rPr>
+              <a:t>, </a:t>
+            </a:r>
+            <a:r>
+              <a:rPr lang="en-US" sz="900" dirty="0" err="1">
+                <a:latin typeface="Avenir Book"/>
+                <a:cs typeface="Avenir Book"/>
+              </a:rPr>
+              <a:t>sunt</a:t>
+            </a:r>
+            <a:r>
+              <a:rPr lang="en-US" sz="900" dirty="0">
+                <a:latin typeface="Avenir Book"/>
+                <a:cs typeface="Avenir Book"/>
+              </a:rPr>
+              <a:t> in culpa qui </a:t>
+            </a:r>
+            <a:r>
+              <a:rPr lang="en-US" sz="900" dirty="0" err="1">
+                <a:latin typeface="Avenir Book"/>
+                <a:cs typeface="Avenir Book"/>
+              </a:rPr>
+              <a:t>officia</a:t>
+            </a:r>
+            <a:r>
+              <a:rPr lang="en-US" sz="900" dirty="0">
+                <a:latin typeface="Avenir Book"/>
+                <a:cs typeface="Avenir Book"/>
+              </a:rPr>
+              <a:t> </a:t>
+            </a:r>
+            <a:r>
+              <a:rPr lang="en-US" sz="900" dirty="0" err="1">
+                <a:latin typeface="Avenir Book"/>
+                <a:cs typeface="Avenir Book"/>
+              </a:rPr>
+              <a:t>deserunt</a:t>
+            </a:r>
+            <a:r>
+              <a:rPr lang="en-US" sz="900" dirty="0">
+                <a:latin typeface="Avenir Book"/>
+                <a:cs typeface="Avenir Book"/>
+              </a:rPr>
+              <a:t> </a:t>
+            </a:r>
+            <a:r>
+              <a:rPr lang="en-US" sz="900" dirty="0" err="1">
+                <a:latin typeface="Avenir Book"/>
+                <a:cs typeface="Avenir Book"/>
+              </a:rPr>
+              <a:t>mollit</a:t>
+            </a:r>
+            <a:r>
+              <a:rPr lang="en-US" sz="900" dirty="0">
+                <a:latin typeface="Avenir Book"/>
+                <a:cs typeface="Avenir Book"/>
+              </a:rPr>
+              <a:t> </a:t>
+            </a:r>
+            <a:r>
+              <a:rPr lang="en-US" sz="900" dirty="0" err="1">
+                <a:latin typeface="Avenir Book"/>
+                <a:cs typeface="Avenir Book"/>
+              </a:rPr>
+              <a:t>anim</a:t>
+            </a:r>
+            <a:r>
+              <a:rPr lang="en-US" sz="900" dirty="0">
+                <a:latin typeface="Avenir Book"/>
+                <a:cs typeface="Avenir Book"/>
+              </a:rPr>
+              <a:t> id </a:t>
+            </a:r>
+            <a:r>
+              <a:rPr lang="en-US" sz="900" dirty="0" err="1">
+                <a:latin typeface="Avenir Book"/>
+                <a:cs typeface="Avenir Book"/>
+              </a:rPr>
+              <a:t>est</a:t>
+            </a:r>
+            <a:r>
+              <a:rPr lang="en-US" sz="900" dirty="0">
+                <a:latin typeface="Avenir Book"/>
+                <a:cs typeface="Avenir Book"/>
+              </a:rPr>
+              <a:t> </a:t>
+            </a:r>
+            <a:r>
+              <a:rPr lang="en-US" sz="900" dirty="0" err="1">
+                <a:latin typeface="Avenir Book"/>
+                <a:cs typeface="Avenir Book"/>
+              </a:rPr>
+              <a:t>laborum</a:t>
+            </a:r>
             <a:r>
               <a:rPr lang="en-US" sz="900" dirty="0" smtClean="0">
                 <a:latin typeface="Avenir Book"/>
                 <a:cs typeface="Avenir Book"/>
               </a:rPr>
-              <a:t>Blah blah blah blah interesting things</a:t>
-            </a:r>
-          </a:p>
-          <a:p>
-            <a:endParaRPr lang="en-US" sz="900" dirty="0">
-              <a:latin typeface="Avenir Book"/>
-              <a:cs typeface="Avenir Book"/>
-            </a:endParaRPr>
+              <a:t>.</a:t>
+            </a:r>
           </a:p>
           <a:p>
             <a:endParaRPr lang="en-US" sz="900" dirty="0" smtClean="0">
@@ -5387,36 +6073,722 @@
           <a:lstStyle/>
           <a:p>
             <a:r>
-              <a:rPr lang="en-US" sz="900" dirty="0" smtClean="0">
-                <a:latin typeface="Avenir Book"/>
-                <a:cs typeface="Avenir Book"/>
-              </a:rPr>
-              <a:t>Fires blah blah blah blah blah fires are dangerous they burn things. This is a paragraph all about fires and their scariness and how much they are terrifying and creepy and make me crawl into a bunker.</a:t>
+              <a:rPr lang="en-US" sz="900" dirty="0" err="1">
+                <a:latin typeface="Avenir Book"/>
+                <a:cs typeface="Avenir Book"/>
+              </a:rPr>
+              <a:t>Lorem</a:t>
+            </a:r>
+            <a:r>
+              <a:rPr lang="en-US" sz="900" dirty="0">
+                <a:latin typeface="Avenir Book"/>
+                <a:cs typeface="Avenir Book"/>
+              </a:rPr>
+              <a:t> </a:t>
+            </a:r>
+            <a:r>
+              <a:rPr lang="en-US" sz="900" dirty="0" err="1">
+                <a:latin typeface="Avenir Book"/>
+                <a:cs typeface="Avenir Book"/>
+              </a:rPr>
+              <a:t>ipsum</a:t>
+            </a:r>
+            <a:r>
+              <a:rPr lang="en-US" sz="900" dirty="0">
+                <a:latin typeface="Avenir Book"/>
+                <a:cs typeface="Avenir Book"/>
+              </a:rPr>
+              <a:t> dolor sit </a:t>
+            </a:r>
+            <a:r>
+              <a:rPr lang="en-US" sz="900" dirty="0" err="1">
+                <a:latin typeface="Avenir Book"/>
+                <a:cs typeface="Avenir Book"/>
+              </a:rPr>
+              <a:t>amet</a:t>
+            </a:r>
+            <a:r>
+              <a:rPr lang="en-US" sz="900" dirty="0">
+                <a:latin typeface="Avenir Book"/>
+                <a:cs typeface="Avenir Book"/>
+              </a:rPr>
+              <a:t>, </a:t>
+            </a:r>
+            <a:r>
+              <a:rPr lang="en-US" sz="900" dirty="0" err="1">
+                <a:latin typeface="Avenir Book"/>
+                <a:cs typeface="Avenir Book"/>
+              </a:rPr>
+              <a:t>consectetur</a:t>
+            </a:r>
+            <a:r>
+              <a:rPr lang="en-US" sz="900" dirty="0">
+                <a:latin typeface="Avenir Book"/>
+                <a:cs typeface="Avenir Book"/>
+              </a:rPr>
+              <a:t> </a:t>
+            </a:r>
+            <a:r>
+              <a:rPr lang="en-US" sz="900" dirty="0" err="1">
+                <a:latin typeface="Avenir Book"/>
+                <a:cs typeface="Avenir Book"/>
+              </a:rPr>
+              <a:t>adipisicing</a:t>
+            </a:r>
+            <a:r>
+              <a:rPr lang="en-US" sz="900" dirty="0">
+                <a:latin typeface="Avenir Book"/>
+                <a:cs typeface="Avenir Book"/>
+              </a:rPr>
+              <a:t> </a:t>
+            </a:r>
+            <a:r>
+              <a:rPr lang="en-US" sz="900" dirty="0" err="1">
+                <a:latin typeface="Avenir Book"/>
+                <a:cs typeface="Avenir Book"/>
+              </a:rPr>
+              <a:t>elit</a:t>
+            </a:r>
+            <a:r>
+              <a:rPr lang="en-US" sz="900" dirty="0">
+                <a:latin typeface="Avenir Book"/>
+                <a:cs typeface="Avenir Book"/>
+              </a:rPr>
+              <a:t>, </a:t>
+            </a:r>
+            <a:r>
+              <a:rPr lang="en-US" sz="900" dirty="0" err="1">
+                <a:latin typeface="Avenir Book"/>
+                <a:cs typeface="Avenir Book"/>
+              </a:rPr>
+              <a:t>sed</a:t>
+            </a:r>
+            <a:r>
+              <a:rPr lang="en-US" sz="900" dirty="0">
+                <a:latin typeface="Avenir Book"/>
+                <a:cs typeface="Avenir Book"/>
+              </a:rPr>
+              <a:t> do </a:t>
+            </a:r>
+            <a:r>
+              <a:rPr lang="en-US" sz="900" dirty="0" err="1">
+                <a:latin typeface="Avenir Book"/>
+                <a:cs typeface="Avenir Book"/>
+              </a:rPr>
+              <a:t>eiusmod</a:t>
+            </a:r>
+            <a:r>
+              <a:rPr lang="en-US" sz="900" dirty="0">
+                <a:latin typeface="Avenir Book"/>
+                <a:cs typeface="Avenir Book"/>
+              </a:rPr>
+              <a:t> </a:t>
+            </a:r>
+            <a:r>
+              <a:rPr lang="en-US" sz="900" dirty="0" err="1">
+                <a:latin typeface="Avenir Book"/>
+                <a:cs typeface="Avenir Book"/>
+              </a:rPr>
+              <a:t>tempor</a:t>
+            </a:r>
+            <a:r>
+              <a:rPr lang="en-US" sz="900" dirty="0">
+                <a:latin typeface="Avenir Book"/>
+                <a:cs typeface="Avenir Book"/>
+              </a:rPr>
+              <a:t> </a:t>
+            </a:r>
+            <a:r>
+              <a:rPr lang="en-US" sz="900" dirty="0" err="1">
+                <a:latin typeface="Avenir Book"/>
+                <a:cs typeface="Avenir Book"/>
+              </a:rPr>
+              <a:t>incididunt</a:t>
+            </a:r>
+            <a:r>
+              <a:rPr lang="en-US" sz="900" dirty="0">
+                <a:latin typeface="Avenir Book"/>
+                <a:cs typeface="Avenir Book"/>
+              </a:rPr>
+              <a:t> </a:t>
+            </a:r>
+            <a:r>
+              <a:rPr lang="en-US" sz="900" dirty="0" err="1">
+                <a:latin typeface="Avenir Book"/>
+                <a:cs typeface="Avenir Book"/>
+              </a:rPr>
+              <a:t>ut</a:t>
+            </a:r>
+            <a:r>
+              <a:rPr lang="en-US" sz="900" dirty="0">
+                <a:latin typeface="Avenir Book"/>
+                <a:cs typeface="Avenir Book"/>
+              </a:rPr>
+              <a:t> </a:t>
+            </a:r>
+            <a:r>
+              <a:rPr lang="en-US" sz="900" dirty="0" err="1">
+                <a:latin typeface="Avenir Book"/>
+                <a:cs typeface="Avenir Book"/>
+              </a:rPr>
+              <a:t>labore</a:t>
+            </a:r>
+            <a:r>
+              <a:rPr lang="en-US" sz="900" dirty="0">
+                <a:latin typeface="Avenir Book"/>
+                <a:cs typeface="Avenir Book"/>
+              </a:rPr>
+              <a:t> et </a:t>
+            </a:r>
+            <a:r>
+              <a:rPr lang="en-US" sz="900" dirty="0" err="1">
+                <a:latin typeface="Avenir Book"/>
+                <a:cs typeface="Avenir Book"/>
+              </a:rPr>
+              <a:t>dolore</a:t>
+            </a:r>
+            <a:r>
+              <a:rPr lang="en-US" sz="900" dirty="0">
+                <a:latin typeface="Avenir Book"/>
+                <a:cs typeface="Avenir Book"/>
+              </a:rPr>
+              <a:t> magna </a:t>
+            </a:r>
+            <a:r>
+              <a:rPr lang="en-US" sz="900" dirty="0" err="1">
+                <a:latin typeface="Avenir Book"/>
+                <a:cs typeface="Avenir Book"/>
+              </a:rPr>
+              <a:t>aliqua</a:t>
+            </a:r>
+            <a:r>
+              <a:rPr lang="en-US" sz="900" dirty="0">
+                <a:latin typeface="Avenir Book"/>
+                <a:cs typeface="Avenir Book"/>
+              </a:rPr>
+              <a:t>. </a:t>
+            </a:r>
+            <a:r>
+              <a:rPr lang="en-US" sz="900" dirty="0" err="1">
+                <a:latin typeface="Avenir Book"/>
+                <a:cs typeface="Avenir Book"/>
+              </a:rPr>
+              <a:t>Ut</a:t>
+            </a:r>
+            <a:r>
+              <a:rPr lang="en-US" sz="900" dirty="0">
+                <a:latin typeface="Avenir Book"/>
+                <a:cs typeface="Avenir Book"/>
+              </a:rPr>
+              <a:t> </a:t>
+            </a:r>
+            <a:r>
+              <a:rPr lang="en-US" sz="900" dirty="0" err="1">
+                <a:latin typeface="Avenir Book"/>
+                <a:cs typeface="Avenir Book"/>
+              </a:rPr>
+              <a:t>enim</a:t>
+            </a:r>
+            <a:r>
+              <a:rPr lang="en-US" sz="900" dirty="0">
+                <a:latin typeface="Avenir Book"/>
+                <a:cs typeface="Avenir Book"/>
+              </a:rPr>
+              <a:t> ad minim </a:t>
+            </a:r>
+            <a:r>
+              <a:rPr lang="en-US" sz="900" dirty="0" err="1">
+                <a:latin typeface="Avenir Book"/>
+                <a:cs typeface="Avenir Book"/>
+              </a:rPr>
+              <a:t>veniam</a:t>
+            </a:r>
+            <a:r>
+              <a:rPr lang="en-US" sz="900" dirty="0">
+                <a:latin typeface="Avenir Book"/>
+                <a:cs typeface="Avenir Book"/>
+              </a:rPr>
+              <a:t>, </a:t>
+            </a:r>
+            <a:r>
+              <a:rPr lang="en-US" sz="900" dirty="0" err="1">
+                <a:latin typeface="Avenir Book"/>
+                <a:cs typeface="Avenir Book"/>
+              </a:rPr>
+              <a:t>quis</a:t>
+            </a:r>
+            <a:r>
+              <a:rPr lang="en-US" sz="900" dirty="0">
+                <a:latin typeface="Avenir Book"/>
+                <a:cs typeface="Avenir Book"/>
+              </a:rPr>
+              <a:t> </a:t>
+            </a:r>
+            <a:r>
+              <a:rPr lang="en-US" sz="900" dirty="0" err="1">
+                <a:latin typeface="Avenir Book"/>
+                <a:cs typeface="Avenir Book"/>
+              </a:rPr>
+              <a:t>nostrud</a:t>
+            </a:r>
+            <a:r>
+              <a:rPr lang="en-US" sz="900" dirty="0">
+                <a:latin typeface="Avenir Book"/>
+                <a:cs typeface="Avenir Book"/>
+              </a:rPr>
+              <a:t> exercitation </a:t>
+            </a:r>
+            <a:r>
+              <a:rPr lang="en-US" sz="900" dirty="0" err="1">
+                <a:latin typeface="Avenir Book"/>
+                <a:cs typeface="Avenir Book"/>
+              </a:rPr>
+              <a:t>ullamco</a:t>
+            </a:r>
+            <a:r>
+              <a:rPr lang="en-US" sz="900" dirty="0">
+                <a:latin typeface="Avenir Book"/>
+                <a:cs typeface="Avenir Book"/>
+              </a:rPr>
+              <a:t> </a:t>
+            </a:r>
+            <a:r>
+              <a:rPr lang="en-US" sz="900" dirty="0" err="1">
+                <a:latin typeface="Avenir Book"/>
+                <a:cs typeface="Avenir Book"/>
+              </a:rPr>
+              <a:t>laboris</a:t>
+            </a:r>
+            <a:r>
+              <a:rPr lang="en-US" sz="900" dirty="0">
+                <a:latin typeface="Avenir Book"/>
+                <a:cs typeface="Avenir Book"/>
+              </a:rPr>
+              <a:t> nisi </a:t>
+            </a:r>
+            <a:r>
+              <a:rPr lang="en-US" sz="900" dirty="0" err="1">
+                <a:latin typeface="Avenir Book"/>
+                <a:cs typeface="Avenir Book"/>
+              </a:rPr>
+              <a:t>ut</a:t>
+            </a:r>
+            <a:r>
+              <a:rPr lang="en-US" sz="900" dirty="0">
+                <a:latin typeface="Avenir Book"/>
+                <a:cs typeface="Avenir Book"/>
+              </a:rPr>
+              <a:t> </a:t>
+            </a:r>
+            <a:r>
+              <a:rPr lang="en-US" sz="900" dirty="0" err="1">
+                <a:latin typeface="Avenir Book"/>
+                <a:cs typeface="Avenir Book"/>
+              </a:rPr>
+              <a:t>aliquip</a:t>
+            </a:r>
+            <a:r>
+              <a:rPr lang="en-US" sz="900" dirty="0">
+                <a:latin typeface="Avenir Book"/>
+                <a:cs typeface="Avenir Book"/>
+              </a:rPr>
+              <a:t> ex </a:t>
+            </a:r>
+            <a:r>
+              <a:rPr lang="en-US" sz="900" dirty="0" err="1">
+                <a:latin typeface="Avenir Book"/>
+                <a:cs typeface="Avenir Book"/>
+              </a:rPr>
+              <a:t>ea</a:t>
+            </a:r>
+            <a:r>
+              <a:rPr lang="en-US" sz="900" dirty="0">
+                <a:latin typeface="Avenir Book"/>
+                <a:cs typeface="Avenir Book"/>
+              </a:rPr>
+              <a:t> </a:t>
+            </a:r>
+            <a:r>
+              <a:rPr lang="en-US" sz="900" dirty="0" err="1">
+                <a:latin typeface="Avenir Book"/>
+                <a:cs typeface="Avenir Book"/>
+              </a:rPr>
+              <a:t>commodo</a:t>
+            </a:r>
+            <a:r>
+              <a:rPr lang="en-US" sz="900" dirty="0">
+                <a:latin typeface="Avenir Book"/>
+                <a:cs typeface="Avenir Book"/>
+              </a:rPr>
+              <a:t> </a:t>
+            </a:r>
+            <a:r>
+              <a:rPr lang="en-US" sz="900" dirty="0" err="1">
+                <a:latin typeface="Avenir Book"/>
+                <a:cs typeface="Avenir Book"/>
+              </a:rPr>
+              <a:t>consequat</a:t>
+            </a:r>
+            <a:r>
+              <a:rPr lang="en-US" sz="900" dirty="0">
+                <a:latin typeface="Avenir Book"/>
+                <a:cs typeface="Avenir Book"/>
+              </a:rPr>
+              <a:t>. </a:t>
+            </a:r>
+            <a:r>
+              <a:rPr lang="en-US" sz="900" dirty="0" err="1">
+                <a:latin typeface="Avenir Book"/>
+                <a:cs typeface="Avenir Book"/>
+              </a:rPr>
+              <a:t>Duis</a:t>
+            </a:r>
+            <a:r>
+              <a:rPr lang="en-US" sz="900" dirty="0">
+                <a:latin typeface="Avenir Book"/>
+                <a:cs typeface="Avenir Book"/>
+              </a:rPr>
+              <a:t> </a:t>
+            </a:r>
+            <a:r>
+              <a:rPr lang="en-US" sz="900" dirty="0" err="1">
+                <a:latin typeface="Avenir Book"/>
+                <a:cs typeface="Avenir Book"/>
+              </a:rPr>
+              <a:t>aute</a:t>
+            </a:r>
+            <a:r>
+              <a:rPr lang="en-US" sz="900" dirty="0">
+                <a:latin typeface="Avenir Book"/>
+                <a:cs typeface="Avenir Book"/>
+              </a:rPr>
+              <a:t> </a:t>
+            </a:r>
+            <a:r>
+              <a:rPr lang="en-US" sz="900" dirty="0" err="1">
+                <a:latin typeface="Avenir Book"/>
+                <a:cs typeface="Avenir Book"/>
+              </a:rPr>
+              <a:t>irure</a:t>
+            </a:r>
+            <a:r>
+              <a:rPr lang="en-US" sz="900" dirty="0">
+                <a:latin typeface="Avenir Book"/>
+                <a:cs typeface="Avenir Book"/>
+              </a:rPr>
+              <a:t> dolor in </a:t>
+            </a:r>
+            <a:r>
+              <a:rPr lang="en-US" sz="900" dirty="0" err="1">
+                <a:latin typeface="Avenir Book"/>
+                <a:cs typeface="Avenir Book"/>
+              </a:rPr>
+              <a:t>reprehenderit</a:t>
+            </a:r>
+            <a:r>
+              <a:rPr lang="en-US" sz="900" dirty="0">
+                <a:latin typeface="Avenir Book"/>
+                <a:cs typeface="Avenir Book"/>
+              </a:rPr>
+              <a:t> in </a:t>
+            </a:r>
+            <a:r>
+              <a:rPr lang="en-US" sz="900" dirty="0" err="1">
+                <a:latin typeface="Avenir Book"/>
+                <a:cs typeface="Avenir Book"/>
+              </a:rPr>
+              <a:t>voluptate</a:t>
+            </a:r>
+            <a:r>
+              <a:rPr lang="en-US" sz="900" dirty="0">
+                <a:latin typeface="Avenir Book"/>
+                <a:cs typeface="Avenir Book"/>
+              </a:rPr>
+              <a:t> </a:t>
+            </a:r>
+            <a:r>
+              <a:rPr lang="en-US" sz="900" dirty="0" err="1">
+                <a:latin typeface="Avenir Book"/>
+                <a:cs typeface="Avenir Book"/>
+              </a:rPr>
+              <a:t>velit</a:t>
+            </a:r>
+            <a:r>
+              <a:rPr lang="en-US" sz="900" dirty="0">
+                <a:latin typeface="Avenir Book"/>
+                <a:cs typeface="Avenir Book"/>
+              </a:rPr>
+              <a:t> </a:t>
+            </a:r>
+            <a:r>
+              <a:rPr lang="en-US" sz="900" dirty="0" err="1">
+                <a:latin typeface="Avenir Book"/>
+                <a:cs typeface="Avenir Book"/>
+              </a:rPr>
+              <a:t>esse</a:t>
+            </a:r>
+            <a:r>
+              <a:rPr lang="en-US" sz="900" dirty="0">
+                <a:latin typeface="Avenir Book"/>
+                <a:cs typeface="Avenir Book"/>
+              </a:rPr>
+              <a:t> </a:t>
+            </a:r>
+            <a:r>
+              <a:rPr lang="en-US" sz="900" dirty="0" err="1">
+                <a:latin typeface="Avenir Book"/>
+                <a:cs typeface="Avenir Book"/>
+              </a:rPr>
+              <a:t>cillum</a:t>
+            </a:r>
+            <a:r>
+              <a:rPr lang="en-US" sz="900" dirty="0">
+                <a:latin typeface="Avenir Book"/>
+                <a:cs typeface="Avenir Book"/>
+              </a:rPr>
+              <a:t> </a:t>
+            </a:r>
+            <a:r>
+              <a:rPr lang="en-US" sz="900" dirty="0" err="1">
+                <a:latin typeface="Avenir Book"/>
+                <a:cs typeface="Avenir Book"/>
+              </a:rPr>
+              <a:t>dolore</a:t>
+            </a:r>
+            <a:r>
+              <a:rPr lang="en-US" sz="900" dirty="0">
+                <a:latin typeface="Avenir Book"/>
+                <a:cs typeface="Avenir Book"/>
+              </a:rPr>
+              <a:t> </a:t>
+            </a:r>
+            <a:r>
+              <a:rPr lang="en-US" sz="900" dirty="0" err="1">
+                <a:latin typeface="Avenir Book"/>
+                <a:cs typeface="Avenir Book"/>
+              </a:rPr>
+              <a:t>eu</a:t>
+            </a:r>
+            <a:r>
+              <a:rPr lang="en-US" sz="900" dirty="0">
+                <a:latin typeface="Avenir Book"/>
+                <a:cs typeface="Avenir Book"/>
+              </a:rPr>
+              <a:t> </a:t>
+            </a:r>
+            <a:r>
+              <a:rPr lang="en-US" sz="900" dirty="0" err="1">
+                <a:latin typeface="Avenir Book"/>
+                <a:cs typeface="Avenir Book"/>
+              </a:rPr>
+              <a:t>fugiat</a:t>
+            </a:r>
+            <a:r>
+              <a:rPr lang="en-US" sz="900" dirty="0">
+                <a:latin typeface="Avenir Book"/>
+                <a:cs typeface="Avenir Book"/>
+              </a:rPr>
+              <a:t> </a:t>
+            </a:r>
+            <a:r>
+              <a:rPr lang="en-US" sz="900" dirty="0" err="1">
+                <a:latin typeface="Avenir Book"/>
+                <a:cs typeface="Avenir Book"/>
+              </a:rPr>
+              <a:t>nulla</a:t>
+            </a:r>
+            <a:r>
+              <a:rPr lang="en-US" sz="900" dirty="0">
+                <a:latin typeface="Avenir Book"/>
+                <a:cs typeface="Avenir Book"/>
+              </a:rPr>
+              <a:t> </a:t>
+            </a:r>
+            <a:r>
+              <a:rPr lang="en-US" sz="900" dirty="0" err="1">
+                <a:latin typeface="Avenir Book"/>
+                <a:cs typeface="Avenir Book"/>
+              </a:rPr>
+              <a:t>pariatur</a:t>
+            </a:r>
+            <a:r>
+              <a:rPr lang="en-US" sz="900" dirty="0">
+                <a:latin typeface="Avenir Book"/>
+                <a:cs typeface="Avenir Book"/>
+              </a:rPr>
+              <a:t>. </a:t>
+            </a:r>
+            <a:r>
+              <a:rPr lang="en-US" sz="900" dirty="0" err="1">
+                <a:latin typeface="Avenir Book"/>
+                <a:cs typeface="Avenir Book"/>
+              </a:rPr>
+              <a:t>Excepteur</a:t>
+            </a:r>
+            <a:r>
+              <a:rPr lang="en-US" sz="900" dirty="0">
+                <a:latin typeface="Avenir Book"/>
+                <a:cs typeface="Avenir Book"/>
+              </a:rPr>
+              <a:t> </a:t>
+            </a:r>
+            <a:r>
+              <a:rPr lang="en-US" sz="900" dirty="0" err="1">
+                <a:latin typeface="Avenir Book"/>
+                <a:cs typeface="Avenir Book"/>
+              </a:rPr>
+              <a:t>sint</a:t>
+            </a:r>
+            <a:r>
+              <a:rPr lang="en-US" sz="900" dirty="0">
+                <a:latin typeface="Avenir Book"/>
+                <a:cs typeface="Avenir Book"/>
+              </a:rPr>
+              <a:t> </a:t>
+            </a:r>
+            <a:r>
+              <a:rPr lang="en-US" sz="900" dirty="0" err="1">
+                <a:latin typeface="Avenir Book"/>
+                <a:cs typeface="Avenir Book"/>
+              </a:rPr>
+              <a:t>occaecat</a:t>
+            </a:r>
+            <a:r>
+              <a:rPr lang="en-US" sz="900" dirty="0">
+                <a:latin typeface="Avenir Book"/>
+                <a:cs typeface="Avenir Book"/>
+              </a:rPr>
+              <a:t> </a:t>
+            </a:r>
+            <a:r>
+              <a:rPr lang="en-US" sz="900" dirty="0" err="1">
+                <a:latin typeface="Avenir Book"/>
+                <a:cs typeface="Avenir Book"/>
+              </a:rPr>
+              <a:t>cupidatat</a:t>
+            </a:r>
+            <a:r>
+              <a:rPr lang="en-US" sz="900" dirty="0">
+                <a:latin typeface="Avenir Book"/>
+                <a:cs typeface="Avenir Book"/>
+              </a:rPr>
+              <a:t> non </a:t>
+            </a:r>
+            <a:r>
+              <a:rPr lang="en-US" sz="900" dirty="0" err="1">
+                <a:latin typeface="Avenir Book"/>
+                <a:cs typeface="Avenir Book"/>
+              </a:rPr>
+              <a:t>proident</a:t>
+            </a:r>
+            <a:r>
+              <a:rPr lang="en-US" sz="900" dirty="0">
+                <a:latin typeface="Avenir Book"/>
+                <a:cs typeface="Avenir Book"/>
+              </a:rPr>
+              <a:t>, </a:t>
+            </a:r>
+            <a:r>
+              <a:rPr lang="en-US" sz="900" dirty="0" err="1">
+                <a:latin typeface="Avenir Book"/>
+                <a:cs typeface="Avenir Book"/>
+              </a:rPr>
+              <a:t>sunt</a:t>
+            </a:r>
+            <a:r>
+              <a:rPr lang="en-US" sz="900" dirty="0">
+                <a:latin typeface="Avenir Book"/>
+                <a:cs typeface="Avenir Book"/>
+              </a:rPr>
+              <a:t> in culpa qui </a:t>
+            </a:r>
+            <a:r>
+              <a:rPr lang="en-US" sz="900" dirty="0" err="1">
+                <a:latin typeface="Avenir Book"/>
+                <a:cs typeface="Avenir Book"/>
+              </a:rPr>
+              <a:t>officia</a:t>
+            </a:r>
+            <a:r>
+              <a:rPr lang="en-US" sz="900" dirty="0">
+                <a:latin typeface="Avenir Book"/>
+                <a:cs typeface="Avenir Book"/>
+              </a:rPr>
+              <a:t> </a:t>
+            </a:r>
+            <a:r>
+              <a:rPr lang="en-US" sz="900" dirty="0" err="1">
+                <a:latin typeface="Avenir Book"/>
+                <a:cs typeface="Avenir Book"/>
+              </a:rPr>
+              <a:t>deserunt</a:t>
+            </a:r>
+            <a:r>
+              <a:rPr lang="en-US" sz="900" dirty="0">
+                <a:latin typeface="Avenir Book"/>
+                <a:cs typeface="Avenir Book"/>
+              </a:rPr>
+              <a:t> </a:t>
+            </a:r>
+            <a:r>
+              <a:rPr lang="en-US" sz="900" dirty="0" err="1">
+                <a:latin typeface="Avenir Book"/>
+                <a:cs typeface="Avenir Book"/>
+              </a:rPr>
+              <a:t>mollit</a:t>
+            </a:r>
+            <a:r>
+              <a:rPr lang="en-US" sz="900" dirty="0">
+                <a:latin typeface="Avenir Book"/>
+                <a:cs typeface="Avenir Book"/>
+              </a:rPr>
+              <a:t> </a:t>
+            </a:r>
+            <a:r>
+              <a:rPr lang="en-US" sz="900" dirty="0" err="1">
+                <a:latin typeface="Avenir Book"/>
+                <a:cs typeface="Avenir Book"/>
+              </a:rPr>
+              <a:t>anim</a:t>
+            </a:r>
+            <a:r>
+              <a:rPr lang="en-US" sz="900" dirty="0">
+                <a:latin typeface="Avenir Book"/>
+                <a:cs typeface="Avenir Book"/>
+              </a:rPr>
+              <a:t> id </a:t>
+            </a:r>
+            <a:r>
+              <a:rPr lang="en-US" sz="900" dirty="0" err="1">
+                <a:latin typeface="Avenir Book"/>
+                <a:cs typeface="Avenir Book"/>
+              </a:rPr>
+              <a:t>est</a:t>
+            </a:r>
+            <a:r>
+              <a:rPr lang="en-US" sz="900" dirty="0">
+                <a:latin typeface="Avenir Book"/>
+                <a:cs typeface="Avenir Book"/>
+              </a:rPr>
+              <a:t> </a:t>
+            </a:r>
+            <a:r>
+              <a:rPr lang="en-US" sz="900" dirty="0" err="1">
+                <a:latin typeface="Avenir Book"/>
+                <a:cs typeface="Avenir Book"/>
+              </a:rPr>
+              <a:t>laborum</a:t>
+            </a:r>
+            <a:r>
+              <a:rPr lang="en-US" sz="900" dirty="0">
+                <a:latin typeface="Avenir Book"/>
+                <a:cs typeface="Avenir Book"/>
+              </a:rPr>
+              <a:t>.</a:t>
             </a:r>
           </a:p>
           <a:p>
             <a:endParaRPr lang="en-US" sz="900" dirty="0">
-              <a:latin typeface="Avenir Book"/>
-              <a:cs typeface="Avenir Book"/>
-            </a:endParaRPr>
-          </a:p>
-          <a:p>
-            <a:r>
-              <a:rPr lang="en-US" sz="900" dirty="0" smtClean="0">
-                <a:latin typeface="Avenir Book"/>
-                <a:cs typeface="Avenir Book"/>
-              </a:rPr>
-              <a:t>Blah blah blah blah interesting things</a:t>
-            </a:r>
-          </a:p>
-          <a:p>
-            <a:endParaRPr lang="en-US" sz="900" dirty="0">
-              <a:latin typeface="Avenir Book"/>
-              <a:cs typeface="Avenir Book"/>
-            </a:endParaRPr>
-          </a:p>
-          <a:p>
-            <a:endParaRPr lang="en-US" sz="900" dirty="0" smtClean="0">
               <a:latin typeface="Avenir Book"/>
               <a:cs typeface="Avenir Book"/>
             </a:endParaRPr>

</xml_diff>